<commit_message>
blood pressure map, and ELIXIR-LU tryout
</commit_message>
<xml_diff>
--- a/images/projects/buttons09.pptx
+++ b/images/projects/buttons09.pptx
@@ -112,6 +112,43 @@
 </p:presentation>
 </file>
 
+<file path=ppt/revisionInfo.xml><?xml version="1.0" encoding="utf-8"?>
+<p1510:revInfo xmlns:a="http://schemas.openxmlformats.org/drawingml/2006/main" xmlns:r="http://schemas.openxmlformats.org/officeDocument/2006/relationships" xmlns:p1510="http://schemas.microsoft.com/office/powerpoint/2015/10/main">
+  <p1510:revLst>
+    <p1510:client id="{F4D4D3A1-ED92-0B4A-B413-123CFEAC2E22}" v="1" dt="2025-10-21T15:30:25.466"/>
+  </p1510:revLst>
+</p1510:revInfo>
+</file>
+
+<file path=ppt/changesInfos/changesInfo1.xml><?xml version="1.0" encoding="utf-8"?>
+<pc:chgInfo xmlns:a="http://schemas.openxmlformats.org/drawingml/2006/main" xmlns:r="http://schemas.openxmlformats.org/officeDocument/2006/relationships" xmlns:ac="http://schemas.microsoft.com/office/drawing/2013/main/command" xmlns:pc="http://schemas.microsoft.com/office/powerpoint/2013/main/command">
+  <pc:docChgLst>
+    <pc:chgData name="Marek OSTASZEWSKI" userId="00624aa5-b771-43c9-84d5-eef7f3ee21ed" providerId="ADAL" clId="{BC98EF41-EA13-5C4E-B9F0-3D86C23EBB9C}"/>
+    <pc:docChg chg="modSld">
+      <pc:chgData name="Marek OSTASZEWSKI" userId="00624aa5-b771-43c9-84d5-eef7f3ee21ed" providerId="ADAL" clId="{BC98EF41-EA13-5C4E-B9F0-3D86C23EBB9C}" dt="2025-10-21T15:30:34.785" v="15" actId="20577"/>
+      <pc:docMkLst>
+        <pc:docMk/>
+      </pc:docMkLst>
+      <pc:sldChg chg="addSp modSp mod">
+        <pc:chgData name="Marek OSTASZEWSKI" userId="00624aa5-b771-43c9-84d5-eef7f3ee21ed" providerId="ADAL" clId="{BC98EF41-EA13-5C4E-B9F0-3D86C23EBB9C}" dt="2025-10-21T15:30:34.785" v="15" actId="20577"/>
+        <pc:sldMkLst>
+          <pc:docMk/>
+          <pc:sldMk cId="1231195689" sldId="258"/>
+        </pc:sldMkLst>
+        <pc:spChg chg="add mod">
+          <ac:chgData name="Marek OSTASZEWSKI" userId="00624aa5-b771-43c9-84d5-eef7f3ee21ed" providerId="ADAL" clId="{BC98EF41-EA13-5C4E-B9F0-3D86C23EBB9C}" dt="2025-10-21T15:30:34.785" v="15" actId="20577"/>
+          <ac:spMkLst>
+            <pc:docMk/>
+            <pc:sldMk cId="1231195689" sldId="258"/>
+            <ac:spMk id="5" creationId="{B91C85DB-F6FC-673C-0ECF-CEEFA793A510}"/>
+          </ac:spMkLst>
+        </pc:spChg>
+      </pc:sldChg>
+    </pc:docChg>
+  </pc:docChgLst>
+</pc:chgInfo>
+</file>
+
 <file path=ppt/slideLayouts/slideLayout1.xml><?xml version="1.0" encoding="utf-8"?>
 <p:sldLayout xmlns:a="http://schemas.openxmlformats.org/drawingml/2006/main" xmlns:r="http://schemas.openxmlformats.org/officeDocument/2006/relationships" xmlns:p="http://schemas.openxmlformats.org/presentationml/2006/main" type="title" preserve="1">
   <p:cSld name="Title Slide">
@@ -259,7 +296,7 @@
           <a:p>
             <a:fld id="{40FD3D9A-36CF-C845-9F31-DDC271F1AF6B}" type="datetimeFigureOut">
               <a:rPr lang="en-GB" smtClean="0"/>
-              <a:t>18/12/2024</a:t>
+              <a:t>21/10/2025</a:t>
             </a:fld>
             <a:endParaRPr lang="en-GB"/>
           </a:p>
@@ -457,7 +494,7 @@
           <a:p>
             <a:fld id="{40FD3D9A-36CF-C845-9F31-DDC271F1AF6B}" type="datetimeFigureOut">
               <a:rPr lang="en-GB" smtClean="0"/>
-              <a:t>18/12/2024</a:t>
+              <a:t>21/10/2025</a:t>
             </a:fld>
             <a:endParaRPr lang="en-GB"/>
           </a:p>
@@ -665,7 +702,7 @@
           <a:p>
             <a:fld id="{40FD3D9A-36CF-C845-9F31-DDC271F1AF6B}" type="datetimeFigureOut">
               <a:rPr lang="en-GB" smtClean="0"/>
-              <a:t>18/12/2024</a:t>
+              <a:t>21/10/2025</a:t>
             </a:fld>
             <a:endParaRPr lang="en-GB"/>
           </a:p>
@@ -863,7 +900,7 @@
           <a:p>
             <a:fld id="{40FD3D9A-36CF-C845-9F31-DDC271F1AF6B}" type="datetimeFigureOut">
               <a:rPr lang="en-GB" smtClean="0"/>
-              <a:t>18/12/2024</a:t>
+              <a:t>21/10/2025</a:t>
             </a:fld>
             <a:endParaRPr lang="en-GB"/>
           </a:p>
@@ -1138,7 +1175,7 @@
           <a:p>
             <a:fld id="{40FD3D9A-36CF-C845-9F31-DDC271F1AF6B}" type="datetimeFigureOut">
               <a:rPr lang="en-GB" smtClean="0"/>
-              <a:t>18/12/2024</a:t>
+              <a:t>21/10/2025</a:t>
             </a:fld>
             <a:endParaRPr lang="en-GB"/>
           </a:p>
@@ -1403,7 +1440,7 @@
           <a:p>
             <a:fld id="{40FD3D9A-36CF-C845-9F31-DDC271F1AF6B}" type="datetimeFigureOut">
               <a:rPr lang="en-GB" smtClean="0"/>
-              <a:t>18/12/2024</a:t>
+              <a:t>21/10/2025</a:t>
             </a:fld>
             <a:endParaRPr lang="en-GB"/>
           </a:p>
@@ -1815,7 +1852,7 @@
           <a:p>
             <a:fld id="{40FD3D9A-36CF-C845-9F31-DDC271F1AF6B}" type="datetimeFigureOut">
               <a:rPr lang="en-GB" smtClean="0"/>
-              <a:t>18/12/2024</a:t>
+              <a:t>21/10/2025</a:t>
             </a:fld>
             <a:endParaRPr lang="en-GB"/>
           </a:p>
@@ -1956,7 +1993,7 @@
           <a:p>
             <a:fld id="{40FD3D9A-36CF-C845-9F31-DDC271F1AF6B}" type="datetimeFigureOut">
               <a:rPr lang="en-GB" smtClean="0"/>
-              <a:t>18/12/2024</a:t>
+              <a:t>21/10/2025</a:t>
             </a:fld>
             <a:endParaRPr lang="en-GB"/>
           </a:p>
@@ -2069,7 +2106,7 @@
           <a:p>
             <a:fld id="{40FD3D9A-36CF-C845-9F31-DDC271F1AF6B}" type="datetimeFigureOut">
               <a:rPr lang="en-GB" smtClean="0"/>
-              <a:t>18/12/2024</a:t>
+              <a:t>21/10/2025</a:t>
             </a:fld>
             <a:endParaRPr lang="en-GB"/>
           </a:p>
@@ -2380,7 +2417,7 @@
           <a:p>
             <a:fld id="{40FD3D9A-36CF-C845-9F31-DDC271F1AF6B}" type="datetimeFigureOut">
               <a:rPr lang="en-GB" smtClean="0"/>
-              <a:t>18/12/2024</a:t>
+              <a:t>21/10/2025</a:t>
             </a:fld>
             <a:endParaRPr lang="en-GB"/>
           </a:p>
@@ -2668,7 +2705,7 @@
           <a:p>
             <a:fld id="{40FD3D9A-36CF-C845-9F31-DDC271F1AF6B}" type="datetimeFigureOut">
               <a:rPr lang="en-GB" smtClean="0"/>
-              <a:t>18/12/2024</a:t>
+              <a:t>21/10/2025</a:t>
             </a:fld>
             <a:endParaRPr lang="en-GB"/>
           </a:p>
@@ -2909,7 +2946,7 @@
           <a:p>
             <a:fld id="{40FD3D9A-36CF-C845-9F31-DDC271F1AF6B}" type="datetimeFigureOut">
               <a:rPr lang="en-GB" smtClean="0"/>
-              <a:t>18/12/2024</a:t>
+              <a:t>21/10/2025</a:t>
             </a:fld>
             <a:endParaRPr lang="en-GB"/>
           </a:p>
@@ -5319,6 +5356,89 @@
           </a:p>
         </p:txBody>
       </p:sp>
+      <p:sp>
+        <p:nvSpPr>
+          <p:cNvPr id="5" name="Rounded Rectangle 4">
+            <a:extLst>
+              <a:ext uri="{FF2B5EF4-FFF2-40B4-BE49-F238E27FC236}">
+                <a16:creationId xmlns:a16="http://schemas.microsoft.com/office/drawing/2014/main" id="{B91C85DB-F6FC-673C-0ECF-CEEFA793A510}"/>
+              </a:ext>
+            </a:extLst>
+          </p:cNvPr>
+          <p:cNvSpPr/>
+          <p:nvPr/>
+        </p:nvSpPr>
+        <p:spPr>
+          <a:xfrm>
+            <a:off x="9664435" y="4652124"/>
+            <a:ext cx="1740988" cy="581006"/>
+          </a:xfrm>
+          <a:prstGeom prst="roundRect">
+            <a:avLst>
+              <a:gd name="adj" fmla="val 10628"/>
+            </a:avLst>
+          </a:prstGeom>
+          <a:solidFill>
+            <a:schemeClr val="bg1"/>
+          </a:solidFill>
+          <a:ln w="12700">
+            <a:solidFill>
+              <a:srgbClr val="2E5287"/>
+            </a:solidFill>
+          </a:ln>
+        </p:spPr>
+        <p:style>
+          <a:lnRef idx="2">
+            <a:schemeClr val="accent1">
+              <a:shade val="15000"/>
+            </a:schemeClr>
+          </a:lnRef>
+          <a:fillRef idx="1">
+            <a:schemeClr val="accent1"/>
+          </a:fillRef>
+          <a:effectRef idx="0">
+            <a:schemeClr val="accent1"/>
+          </a:effectRef>
+          <a:fontRef idx="minor">
+            <a:schemeClr val="lt1"/>
+          </a:fontRef>
+        </p:style>
+        <p:txBody>
+          <a:bodyPr rtlCol="0" anchor="t"/>
+          <a:lstStyle/>
+          <a:p>
+            <a:r>
+              <a:rPr lang="en-GB" sz="1400">
+                <a:solidFill>
+                  <a:srgbClr val="2E5287"/>
+                </a:solidFill>
+                <a:latin typeface="Noto Sans InsParthi" panose="020F0502020204030204" pitchFamily="34" charset="0"/>
+                <a:cs typeface="Noto Sans InsParthi" panose="020F0502020204030204" pitchFamily="34" charset="0"/>
+              </a:rPr>
+              <a:t>Blood pressure</a:t>
+            </a:r>
+            <a:endParaRPr lang="en-GB" sz="1400" dirty="0">
+              <a:solidFill>
+                <a:srgbClr val="2E5287"/>
+              </a:solidFill>
+              <a:latin typeface="Noto Sans InsParthi" panose="020F0502020204030204" pitchFamily="34" charset="0"/>
+              <a:cs typeface="Noto Sans InsParthi" panose="020F0502020204030204" pitchFamily="34" charset="0"/>
+            </a:endParaRPr>
+          </a:p>
+          <a:p>
+            <a:r>
+              <a:rPr lang="en-GB" sz="1400" dirty="0">
+                <a:solidFill>
+                  <a:srgbClr val="2E5287"/>
+                </a:solidFill>
+                <a:latin typeface="Noto Sans InsParthi" panose="020F0502020204030204" pitchFamily="34" charset="0"/>
+                <a:cs typeface="Noto Sans InsParthi" panose="020F0502020204030204" pitchFamily="34" charset="0"/>
+              </a:rPr>
+              <a:t>★☆☆☆☆</a:t>
+            </a:r>
+          </a:p>
+        </p:txBody>
+      </p:sp>
     </p:spTree>
     <p:extLst>
       <p:ext uri="{BB962C8B-B14F-4D97-AF65-F5344CB8AC3E}">

</xml_diff>

<commit_message>
update of the bpmap project
</commit_message>
<xml_diff>
--- a/images/projects/buttons09.pptx
+++ b/images/projects/buttons09.pptx
@@ -115,7 +115,7 @@
 <file path=ppt/revisionInfo.xml><?xml version="1.0" encoding="utf-8"?>
 <p1510:revInfo xmlns:a="http://schemas.openxmlformats.org/drawingml/2006/main" xmlns:r="http://schemas.openxmlformats.org/officeDocument/2006/relationships" xmlns:p1510="http://schemas.microsoft.com/office/powerpoint/2015/10/main">
   <p1510:revLst>
-    <p1510:client id="{F4D4D3A1-ED92-0B4A-B413-123CFEAC2E22}" v="1" dt="2025-10-21T15:30:25.466"/>
+    <p1510:client id="{8E454FED-55A1-E94B-90B7-23FF8CCEECCC}" v="1" dt="2026-01-06T13:58:48.443"/>
   </p1510:revLst>
 </p1510:revInfo>
 </file>
@@ -125,18 +125,18 @@
   <pc:docChgLst>
     <pc:chgData name="Marek OSTASZEWSKI" userId="00624aa5-b771-43c9-84d5-eef7f3ee21ed" providerId="ADAL" clId="{BC98EF41-EA13-5C4E-B9F0-3D86C23EBB9C}"/>
     <pc:docChg chg="modSld">
-      <pc:chgData name="Marek OSTASZEWSKI" userId="00624aa5-b771-43c9-84d5-eef7f3ee21ed" providerId="ADAL" clId="{BC98EF41-EA13-5C4E-B9F0-3D86C23EBB9C}" dt="2025-10-21T15:30:34.785" v="15" actId="20577"/>
+      <pc:chgData name="Marek OSTASZEWSKI" userId="00624aa5-b771-43c9-84d5-eef7f3ee21ed" providerId="ADAL" clId="{BC98EF41-EA13-5C4E-B9F0-3D86C23EBB9C}" dt="2026-01-06T13:58:48.443" v="16"/>
       <pc:docMkLst>
         <pc:docMk/>
       </pc:docMkLst>
       <pc:sldChg chg="addSp modSp mod">
-        <pc:chgData name="Marek OSTASZEWSKI" userId="00624aa5-b771-43c9-84d5-eef7f3ee21ed" providerId="ADAL" clId="{BC98EF41-EA13-5C4E-B9F0-3D86C23EBB9C}" dt="2025-10-21T15:30:34.785" v="15" actId="20577"/>
+        <pc:chgData name="Marek OSTASZEWSKI" userId="00624aa5-b771-43c9-84d5-eef7f3ee21ed" providerId="ADAL" clId="{BC98EF41-EA13-5C4E-B9F0-3D86C23EBB9C}" dt="2026-01-06T13:58:48.443" v="16"/>
         <pc:sldMkLst>
           <pc:docMk/>
           <pc:sldMk cId="1231195689" sldId="258"/>
         </pc:sldMkLst>
         <pc:spChg chg="add mod">
-          <ac:chgData name="Marek OSTASZEWSKI" userId="00624aa5-b771-43c9-84d5-eef7f3ee21ed" providerId="ADAL" clId="{BC98EF41-EA13-5C4E-B9F0-3D86C23EBB9C}" dt="2025-10-21T15:30:34.785" v="15" actId="20577"/>
+          <ac:chgData name="Marek OSTASZEWSKI" userId="00624aa5-b771-43c9-84d5-eef7f3ee21ed" providerId="ADAL" clId="{BC98EF41-EA13-5C4E-B9F0-3D86C23EBB9C}" dt="2026-01-06T13:58:48.443" v="16"/>
           <ac:spMkLst>
             <pc:docMk/>
             <pc:sldMk cId="1231195689" sldId="258"/>
@@ -296,7 +296,7 @@
           <a:p>
             <a:fld id="{40FD3D9A-36CF-C845-9F31-DDC271F1AF6B}" type="datetimeFigureOut">
               <a:rPr lang="en-GB" smtClean="0"/>
-              <a:t>21/10/2025</a:t>
+              <a:t>06/01/2026</a:t>
             </a:fld>
             <a:endParaRPr lang="en-GB"/>
           </a:p>
@@ -494,7 +494,7 @@
           <a:p>
             <a:fld id="{40FD3D9A-36CF-C845-9F31-DDC271F1AF6B}" type="datetimeFigureOut">
               <a:rPr lang="en-GB" smtClean="0"/>
-              <a:t>21/10/2025</a:t>
+              <a:t>06/01/2026</a:t>
             </a:fld>
             <a:endParaRPr lang="en-GB"/>
           </a:p>
@@ -702,7 +702,7 @@
           <a:p>
             <a:fld id="{40FD3D9A-36CF-C845-9F31-DDC271F1AF6B}" type="datetimeFigureOut">
               <a:rPr lang="en-GB" smtClean="0"/>
-              <a:t>21/10/2025</a:t>
+              <a:t>06/01/2026</a:t>
             </a:fld>
             <a:endParaRPr lang="en-GB"/>
           </a:p>
@@ -900,7 +900,7 @@
           <a:p>
             <a:fld id="{40FD3D9A-36CF-C845-9F31-DDC271F1AF6B}" type="datetimeFigureOut">
               <a:rPr lang="en-GB" smtClean="0"/>
-              <a:t>21/10/2025</a:t>
+              <a:t>06/01/2026</a:t>
             </a:fld>
             <a:endParaRPr lang="en-GB"/>
           </a:p>
@@ -1175,7 +1175,7 @@
           <a:p>
             <a:fld id="{40FD3D9A-36CF-C845-9F31-DDC271F1AF6B}" type="datetimeFigureOut">
               <a:rPr lang="en-GB" smtClean="0"/>
-              <a:t>21/10/2025</a:t>
+              <a:t>06/01/2026</a:t>
             </a:fld>
             <a:endParaRPr lang="en-GB"/>
           </a:p>
@@ -1440,7 +1440,7 @@
           <a:p>
             <a:fld id="{40FD3D9A-36CF-C845-9F31-DDC271F1AF6B}" type="datetimeFigureOut">
               <a:rPr lang="en-GB" smtClean="0"/>
-              <a:t>21/10/2025</a:t>
+              <a:t>06/01/2026</a:t>
             </a:fld>
             <a:endParaRPr lang="en-GB"/>
           </a:p>
@@ -1852,7 +1852,7 @@
           <a:p>
             <a:fld id="{40FD3D9A-36CF-C845-9F31-DDC271F1AF6B}" type="datetimeFigureOut">
               <a:rPr lang="en-GB" smtClean="0"/>
-              <a:t>21/10/2025</a:t>
+              <a:t>06/01/2026</a:t>
             </a:fld>
             <a:endParaRPr lang="en-GB"/>
           </a:p>
@@ -1993,7 +1993,7 @@
           <a:p>
             <a:fld id="{40FD3D9A-36CF-C845-9F31-DDC271F1AF6B}" type="datetimeFigureOut">
               <a:rPr lang="en-GB" smtClean="0"/>
-              <a:t>21/10/2025</a:t>
+              <a:t>06/01/2026</a:t>
             </a:fld>
             <a:endParaRPr lang="en-GB"/>
           </a:p>
@@ -2106,7 +2106,7 @@
           <a:p>
             <a:fld id="{40FD3D9A-36CF-C845-9F31-DDC271F1AF6B}" type="datetimeFigureOut">
               <a:rPr lang="en-GB" smtClean="0"/>
-              <a:t>21/10/2025</a:t>
+              <a:t>06/01/2026</a:t>
             </a:fld>
             <a:endParaRPr lang="en-GB"/>
           </a:p>
@@ -2417,7 +2417,7 @@
           <a:p>
             <a:fld id="{40FD3D9A-36CF-C845-9F31-DDC271F1AF6B}" type="datetimeFigureOut">
               <a:rPr lang="en-GB" smtClean="0"/>
-              <a:t>21/10/2025</a:t>
+              <a:t>06/01/2026</a:t>
             </a:fld>
             <a:endParaRPr lang="en-GB"/>
           </a:p>
@@ -2705,7 +2705,7 @@
           <a:p>
             <a:fld id="{40FD3D9A-36CF-C845-9F31-DDC271F1AF6B}" type="datetimeFigureOut">
               <a:rPr lang="en-GB" smtClean="0"/>
-              <a:t>21/10/2025</a:t>
+              <a:t>06/01/2026</a:t>
             </a:fld>
             <a:endParaRPr lang="en-GB"/>
           </a:p>
@@ -2946,7 +2946,7 @@
           <a:p>
             <a:fld id="{40FD3D9A-36CF-C845-9F31-DDC271F1AF6B}" type="datetimeFigureOut">
               <a:rPr lang="en-GB" smtClean="0"/>
-              <a:t>21/10/2025</a:t>
+              <a:t>06/01/2026</a:t>
             </a:fld>
             <a:endParaRPr lang="en-GB"/>
           </a:p>
@@ -5408,7 +5408,7 @@
           <a:lstStyle/>
           <a:p>
             <a:r>
-              <a:rPr lang="en-GB" sz="1400">
+              <a:rPr lang="en-GB" sz="1400" dirty="0">
                 <a:solidFill>
                   <a:srgbClr val="2E5287"/>
                 </a:solidFill>
@@ -5417,13 +5417,6 @@
               </a:rPr>
               <a:t>Blood pressure</a:t>
             </a:r>
-            <a:endParaRPr lang="en-GB" sz="1400" dirty="0">
-              <a:solidFill>
-                <a:srgbClr val="2E5287"/>
-              </a:solidFill>
-              <a:latin typeface="Noto Sans InsParthi" panose="020F0502020204030204" pitchFamily="34" charset="0"/>
-              <a:cs typeface="Noto Sans InsParthi" panose="020F0502020204030204" pitchFamily="34" charset="0"/>
-            </a:endParaRPr>
           </a:p>
           <a:p>
             <a:r>
@@ -5434,7 +5427,7 @@
                 <a:latin typeface="Noto Sans InsParthi" panose="020F0502020204030204" pitchFamily="34" charset="0"/>
                 <a:cs typeface="Noto Sans InsParthi" panose="020F0502020204030204" pitchFamily="34" charset="0"/>
               </a:rPr>
-              <a:t>★☆☆☆☆</a:t>
+              <a:t>★★☆☆☆</a:t>
             </a:r>
           </a:p>
         </p:txBody>

</xml_diff>